<commit_message>
day3 sessions 1 and 2 are finished
</commit_message>
<xml_diff>
--- a/doc/slides/day3/session1/Workflows.pptx
+++ b/doc/slides/day3/session1/Workflows.pptx
@@ -200,7 +200,7 @@
             <a:fld id="{100D1066-83F9-5A48-AEC3-0F045DB8C0BC}" type="datetimeFigureOut">
               <a:rPr lang="en-US" smtClean="0"/>
               <a:pPr/>
-              <a:t>9/10/12</a:t>
+              <a:t>9/11/12</a:t>
             </a:fld>
             <a:endParaRPr lang="en-US"/>
           </a:p>
@@ -1004,7 +1004,7 @@
             <a:fld id="{52237D32-0FFC-5843-A066-8EC42D88DFF1}" type="datetimeFigureOut">
               <a:rPr lang="en-US" smtClean="0"/>
               <a:pPr/>
-              <a:t>9/10/12</a:t>
+              <a:t>9/11/12</a:t>
             </a:fld>
             <a:endParaRPr lang="en-US"/>
           </a:p>
@@ -1171,7 +1171,7 @@
             <a:fld id="{52237D32-0FFC-5843-A066-8EC42D88DFF1}" type="datetimeFigureOut">
               <a:rPr lang="en-US" smtClean="0"/>
               <a:pPr/>
-              <a:t>9/10/12</a:t>
+              <a:t>9/11/12</a:t>
             </a:fld>
             <a:endParaRPr lang="en-US"/>
           </a:p>
@@ -1348,7 +1348,7 @@
             <a:fld id="{52237D32-0FFC-5843-A066-8EC42D88DFF1}" type="datetimeFigureOut">
               <a:rPr lang="en-US" smtClean="0"/>
               <a:pPr/>
-              <a:t>9/10/12</a:t>
+              <a:t>9/11/12</a:t>
             </a:fld>
             <a:endParaRPr lang="en-US"/>
           </a:p>
@@ -1515,7 +1515,7 @@
             <a:fld id="{52237D32-0FFC-5843-A066-8EC42D88DFF1}" type="datetimeFigureOut">
               <a:rPr lang="en-US" smtClean="0"/>
               <a:pPr/>
-              <a:t>9/10/12</a:t>
+              <a:t>9/11/12</a:t>
             </a:fld>
             <a:endParaRPr lang="en-US"/>
           </a:p>
@@ -1758,7 +1758,7 @@
             <a:fld id="{52237D32-0FFC-5843-A066-8EC42D88DFF1}" type="datetimeFigureOut">
               <a:rPr lang="en-US" smtClean="0"/>
               <a:pPr/>
-              <a:t>9/10/12</a:t>
+              <a:t>9/11/12</a:t>
             </a:fld>
             <a:endParaRPr lang="en-US"/>
           </a:p>
@@ -2043,7 +2043,7 @@
             <a:fld id="{52237D32-0FFC-5843-A066-8EC42D88DFF1}" type="datetimeFigureOut">
               <a:rPr lang="en-US" smtClean="0"/>
               <a:pPr/>
-              <a:t>9/10/12</a:t>
+              <a:t>9/11/12</a:t>
             </a:fld>
             <a:endParaRPr lang="en-US"/>
           </a:p>
@@ -2462,7 +2462,7 @@
             <a:fld id="{52237D32-0FFC-5843-A066-8EC42D88DFF1}" type="datetimeFigureOut">
               <a:rPr lang="en-US" smtClean="0"/>
               <a:pPr/>
-              <a:t>9/10/12</a:t>
+              <a:t>9/11/12</a:t>
             </a:fld>
             <a:endParaRPr lang="en-US"/>
           </a:p>
@@ -2577,7 +2577,7 @@
             <a:fld id="{52237D32-0FFC-5843-A066-8EC42D88DFF1}" type="datetimeFigureOut">
               <a:rPr lang="en-US" smtClean="0"/>
               <a:pPr/>
-              <a:t>9/10/12</a:t>
+              <a:t>9/11/12</a:t>
             </a:fld>
             <a:endParaRPr lang="en-US"/>
           </a:p>
@@ -2669,7 +2669,7 @@
             <a:fld id="{52237D32-0FFC-5843-A066-8EC42D88DFF1}" type="datetimeFigureOut">
               <a:rPr lang="en-US" smtClean="0"/>
               <a:pPr/>
-              <a:t>9/10/12</a:t>
+              <a:t>9/11/12</a:t>
             </a:fld>
             <a:endParaRPr lang="en-US"/>
           </a:p>
@@ -2943,7 +2943,7 @@
             <a:fld id="{52237D32-0FFC-5843-A066-8EC42D88DFF1}" type="datetimeFigureOut">
               <a:rPr lang="en-US" smtClean="0"/>
               <a:pPr/>
-              <a:t>9/10/12</a:t>
+              <a:t>9/11/12</a:t>
             </a:fld>
             <a:endParaRPr lang="en-US"/>
           </a:p>
@@ -3193,7 +3193,7 @@
             <a:fld id="{52237D32-0FFC-5843-A066-8EC42D88DFF1}" type="datetimeFigureOut">
               <a:rPr lang="en-US" smtClean="0"/>
               <a:pPr/>
-              <a:t>9/10/12</a:t>
+              <a:t>9/11/12</a:t>
             </a:fld>
             <a:endParaRPr lang="en-US"/>
           </a:p>
@@ -3403,7 +3403,7 @@
             <a:fld id="{52237D32-0FFC-5843-A066-8EC42D88DFF1}" type="datetimeFigureOut">
               <a:rPr lang="en-US" smtClean="0"/>
               <a:pPr/>
-              <a:t>9/10/12</a:t>
+              <a:t>9/11/12</a:t>
             </a:fld>
             <a:endParaRPr lang="en-US"/>
           </a:p>
@@ -4452,23 +4452,7 @@
             <a:pPr lvl="1"/>
             <a:r>
               <a:rPr lang="en-US" dirty="0" smtClean="0"/>
-              <a:t>print date, start time, end </a:t>
-            </a:r>
-            <a:r>
-              <a:rPr lang="en-US" dirty="0" smtClean="0"/>
-              <a:t>time</a:t>
-            </a:r>
-            <a:r>
-              <a:rPr lang="en-US" dirty="0" smtClean="0"/>
-              <a:t> </a:t>
-            </a:r>
-            <a:r>
-              <a:rPr lang="en-US" dirty="0" smtClean="0"/>
-              <a:t>to </a:t>
-            </a:r>
-            <a:r>
-              <a:rPr lang="en-US" dirty="0" smtClean="0"/>
-              <a:t>STDOUT log </a:t>
+              <a:t>print date, start time, end time to STDOUT log </a:t>
             </a:r>
           </a:p>
           <a:p>
@@ -4565,31 +4549,7 @@
             </a:r>
             <a:r>
               <a:rPr lang="en-US" dirty="0" smtClean="0"/>
-              <a:t> add/commit all new</a:t>
-            </a:r>
-            <a:r>
-              <a:rPr lang="en-US" dirty="0" smtClean="0"/>
-              <a:t> result files</a:t>
-            </a:r>
-            <a:r>
-              <a:rPr lang="en-US" dirty="0" smtClean="0"/>
-              <a:t>, </a:t>
-            </a:r>
-            <a:r>
-              <a:rPr lang="en-US" dirty="0" smtClean="0"/>
-              <a:t>all</a:t>
-            </a:r>
-            <a:r>
-              <a:rPr lang="en-US" dirty="0" smtClean="0"/>
-              <a:t> previously committed result files removed from the repository itself</a:t>
-            </a:r>
-            <a:r>
-              <a:rPr lang="en-US" dirty="0" smtClean="0"/>
-              <a:t>, </a:t>
-            </a:r>
-            <a:r>
-              <a:rPr lang="en-US" dirty="0" smtClean="0"/>
-              <a:t>and the STDOUT log file immediately before exiting</a:t>
+              <a:t> add/commit all new result files, all previously committed result files removed from the repository itself, and the STDOUT log file immediately before exiting</a:t>
             </a:r>
           </a:p>
           <a:p>
@@ -4857,9 +4817,24 @@
             </a:r>
             <a:r>
               <a:rPr lang="en-US" dirty="0" err="1" smtClean="0"/>
-              <a:t>src/Plasmodium_wrapper.sh</a:t>
+              <a:t>src/</a:t>
+            </a:r>
+            <a:r>
+              <a:rPr lang="en-US" dirty="0" err="1" smtClean="0"/>
+              <a:t>Plasmodium_wrapper.sh</a:t>
             </a:r>
             <a:endParaRPr lang="en-US" dirty="0" smtClean="0"/>
+          </a:p>
+          <a:p>
+            <a:r>
+              <a:rPr lang="en-US" dirty="0" smtClean="0"/>
+              <a:t>examine the log and results directories </a:t>
+            </a:r>
+            <a:r>
+              <a:rPr lang="en-US" smtClean="0"/>
+              <a:t>and subdirectories</a:t>
+            </a:r>
+            <a:endParaRPr lang="en-US" smtClean="0"/>
           </a:p>
           <a:p>
             <a:r>
@@ -4868,11 +4843,7 @@
             </a:r>
             <a:r>
               <a:rPr lang="en-US" dirty="0" smtClean="0"/>
-              <a:t> </a:t>
-            </a:r>
-            <a:r>
-              <a:rPr lang="en-US" smtClean="0"/>
-              <a:t>checkout master</a:t>
+              <a:t> checkout master</a:t>
             </a:r>
           </a:p>
         </p:txBody>

</xml_diff>

<commit_message>
changed exercise just a bit
</commit_message>
<xml_diff>
--- a/doc/slides/day3/session1/Workflows.pptx
+++ b/doc/slides/day3/session1/Workflows.pptx
@@ -200,7 +200,7 @@
             <a:fld id="{100D1066-83F9-5A48-AEC3-0F045DB8C0BC}" type="datetimeFigureOut">
               <a:rPr lang="en-US" smtClean="0"/>
               <a:pPr/>
-              <a:t>9/11/12</a:t>
+              <a:t>9/12/12</a:t>
             </a:fld>
             <a:endParaRPr lang="en-US"/>
           </a:p>
@@ -1004,7 +1004,7 @@
             <a:fld id="{52237D32-0FFC-5843-A066-8EC42D88DFF1}" type="datetimeFigureOut">
               <a:rPr lang="en-US" smtClean="0"/>
               <a:pPr/>
-              <a:t>9/11/12</a:t>
+              <a:t>9/12/12</a:t>
             </a:fld>
             <a:endParaRPr lang="en-US"/>
           </a:p>
@@ -1171,7 +1171,7 @@
             <a:fld id="{52237D32-0FFC-5843-A066-8EC42D88DFF1}" type="datetimeFigureOut">
               <a:rPr lang="en-US" smtClean="0"/>
               <a:pPr/>
-              <a:t>9/11/12</a:t>
+              <a:t>9/12/12</a:t>
             </a:fld>
             <a:endParaRPr lang="en-US"/>
           </a:p>
@@ -1348,7 +1348,7 @@
             <a:fld id="{52237D32-0FFC-5843-A066-8EC42D88DFF1}" type="datetimeFigureOut">
               <a:rPr lang="en-US" smtClean="0"/>
               <a:pPr/>
-              <a:t>9/11/12</a:t>
+              <a:t>9/12/12</a:t>
             </a:fld>
             <a:endParaRPr lang="en-US"/>
           </a:p>
@@ -1515,7 +1515,7 @@
             <a:fld id="{52237D32-0FFC-5843-A066-8EC42D88DFF1}" type="datetimeFigureOut">
               <a:rPr lang="en-US" smtClean="0"/>
               <a:pPr/>
-              <a:t>9/11/12</a:t>
+              <a:t>9/12/12</a:t>
             </a:fld>
             <a:endParaRPr lang="en-US"/>
           </a:p>
@@ -1758,7 +1758,7 @@
             <a:fld id="{52237D32-0FFC-5843-A066-8EC42D88DFF1}" type="datetimeFigureOut">
               <a:rPr lang="en-US" smtClean="0"/>
               <a:pPr/>
-              <a:t>9/11/12</a:t>
+              <a:t>9/12/12</a:t>
             </a:fld>
             <a:endParaRPr lang="en-US"/>
           </a:p>
@@ -2043,7 +2043,7 @@
             <a:fld id="{52237D32-0FFC-5843-A066-8EC42D88DFF1}" type="datetimeFigureOut">
               <a:rPr lang="en-US" smtClean="0"/>
               <a:pPr/>
-              <a:t>9/11/12</a:t>
+              <a:t>9/12/12</a:t>
             </a:fld>
             <a:endParaRPr lang="en-US"/>
           </a:p>
@@ -2462,7 +2462,7 @@
             <a:fld id="{52237D32-0FFC-5843-A066-8EC42D88DFF1}" type="datetimeFigureOut">
               <a:rPr lang="en-US" smtClean="0"/>
               <a:pPr/>
-              <a:t>9/11/12</a:t>
+              <a:t>9/12/12</a:t>
             </a:fld>
             <a:endParaRPr lang="en-US"/>
           </a:p>
@@ -2577,7 +2577,7 @@
             <a:fld id="{52237D32-0FFC-5843-A066-8EC42D88DFF1}" type="datetimeFigureOut">
               <a:rPr lang="en-US" smtClean="0"/>
               <a:pPr/>
-              <a:t>9/11/12</a:t>
+              <a:t>9/12/12</a:t>
             </a:fld>
             <a:endParaRPr lang="en-US"/>
           </a:p>
@@ -2669,7 +2669,7 @@
             <a:fld id="{52237D32-0FFC-5843-A066-8EC42D88DFF1}" type="datetimeFigureOut">
               <a:rPr lang="en-US" smtClean="0"/>
               <a:pPr/>
-              <a:t>9/11/12</a:t>
+              <a:t>9/12/12</a:t>
             </a:fld>
             <a:endParaRPr lang="en-US"/>
           </a:p>
@@ -2943,7 +2943,7 @@
             <a:fld id="{52237D32-0FFC-5843-A066-8EC42D88DFF1}" type="datetimeFigureOut">
               <a:rPr lang="en-US" smtClean="0"/>
               <a:pPr/>
-              <a:t>9/11/12</a:t>
+              <a:t>9/12/12</a:t>
             </a:fld>
             <a:endParaRPr lang="en-US"/>
           </a:p>
@@ -3193,7 +3193,7 @@
             <a:fld id="{52237D32-0FFC-5843-A066-8EC42D88DFF1}" type="datetimeFigureOut">
               <a:rPr lang="en-US" smtClean="0"/>
               <a:pPr/>
-              <a:t>9/11/12</a:t>
+              <a:t>9/12/12</a:t>
             </a:fld>
             <a:endParaRPr lang="en-US"/>
           </a:p>
@@ -3403,7 +3403,7 @@
             <a:fld id="{52237D32-0FFC-5843-A066-8EC42D88DFF1}" type="datetimeFigureOut">
               <a:rPr lang="en-US" smtClean="0"/>
               <a:pPr/>
-              <a:t>9/11/12</a:t>
+              <a:t>9/12/12</a:t>
             </a:fld>
             <a:endParaRPr lang="en-US"/>
           </a:p>
@@ -4788,53 +4788,65 @@
             </a:r>
             <a:r>
               <a:rPr lang="en-US" dirty="0" smtClean="0"/>
-              <a:t> checkout –</a:t>
+              <a:t> checkout</a:t>
+            </a:r>
+            <a:r>
+              <a:rPr lang="en-US" dirty="0" smtClean="0"/>
+              <a:t> answers_d3s1 </a:t>
             </a:r>
             <a:r>
               <a:rPr lang="en-US" dirty="0" err="1" smtClean="0"/>
-              <a:t>b</a:t>
-            </a:r>
-            <a:r>
-              <a:rPr lang="en-US" dirty="0" smtClean="0"/>
-              <a:t> answers_d3s1 origin/answers_d3s1</a:t>
-            </a:r>
-          </a:p>
-          <a:p>
-            <a:r>
-              <a:rPr lang="en-US" dirty="0" smtClean="0"/>
-              <a:t>edit </a:t>
+              <a:t>src</a:t>
             </a:r>
             <a:r>
               <a:rPr lang="en-US" dirty="0" err="1" smtClean="0"/>
-              <a:t>src/Plasmodium.sh</a:t>
+              <a:t>/Plasmodium.sh</a:t>
             </a:r>
             <a:endParaRPr lang="en-US" dirty="0" smtClean="0"/>
           </a:p>
           <a:p>
             <a:r>
-              <a:rPr lang="en-US" dirty="0" smtClean="0"/>
-              <a:t>edit/run </a:t>
-            </a:r>
-            <a:r>
               <a:rPr lang="en-US" dirty="0" err="1" smtClean="0"/>
-              <a:t>src/</a:t>
+              <a:t>git</a:t>
+            </a:r>
+            <a:r>
+              <a:rPr lang="en-US" dirty="0" smtClean="0"/>
+              <a:t> checkout answers_d3s1 </a:t>
             </a:r>
             <a:r>
               <a:rPr lang="en-US" dirty="0" err="1" smtClean="0"/>
+              <a:t>src</a:t>
+            </a:r>
+            <a:r>
+              <a:rPr lang="en-US" err="1" smtClean="0"/>
+              <a:t>/</a:t>
+            </a:r>
+            <a:r>
+              <a:rPr lang="en-US" smtClean="0"/>
               <a:t>Plasmodium_wrapper.sh</a:t>
             </a:r>
+            <a:endParaRPr lang="en-US" smtClean="0"/>
+          </a:p>
+          <a:p>
+            <a:r>
+              <a:rPr lang="en-US" dirty="0" smtClean="0"/>
+              <a:t>edit</a:t>
+            </a:r>
+            <a:r>
+              <a:rPr lang="en-US" dirty="0" smtClean="0"/>
+              <a:t>/run </a:t>
+            </a:r>
+            <a:r>
+              <a:rPr lang="en-US" dirty="0" err="1" smtClean="0"/>
+              <a:t>src/Plasmodium_wrapper.sh</a:t>
+            </a:r>
             <a:endParaRPr lang="en-US" dirty="0" smtClean="0"/>
           </a:p>
           <a:p>
             <a:r>
               <a:rPr lang="en-US" dirty="0" smtClean="0"/>
-              <a:t>examine the log and results directories </a:t>
-            </a:r>
-            <a:r>
-              <a:rPr lang="en-US" smtClean="0"/>
-              <a:t>and subdirectories</a:t>
-            </a:r>
-            <a:endParaRPr lang="en-US" smtClean="0"/>
+              <a:t>examine the log and results directories and subdirectories</a:t>
+            </a:r>
           </a:p>
           <a:p>
             <a:r>

</xml_diff>